<commit_message>
ENH: Split the test data before SMOTE resampling
The resampling is done only with the selected train dataset
</commit_message>
<xml_diff>
--- a/doc/spie_abstract/2018SPIE-SVA_Poster.pptx
+++ b/doc/spie_abstract/2018SPIE-SVA_Poster.pptx
@@ -3303,7 +3303,7 @@
         </p:nvSpPr>
         <p:spPr bwMode="auto">
           <a:xfrm>
-            <a:off x="25330911" y="31828062"/>
+            <a:off x="25330911" y="31607186"/>
             <a:ext cx="10160000" cy="100012"/>
           </a:xfrm>
           <a:prstGeom prst="rect">
@@ -3347,8 +3347,8 @@
         </p:nvSpPr>
         <p:spPr bwMode="auto">
           <a:xfrm>
-            <a:off x="5496803" y="228600"/>
-            <a:ext cx="24914110" cy="4343400"/>
+            <a:off x="4778954" y="228600"/>
+            <a:ext cx="25631959" cy="4866934"/>
           </a:xfrm>
           <a:prstGeom prst="rect">
             <a:avLst/>
@@ -3414,7 +3414,7 @@
               </a:rPr>
             </a:br>
             <a:r>
-              <a:rPr lang="en-US" sz="4800" i="1" dirty="0">
+              <a:rPr lang="en-US" sz="4800" i="1" dirty="0" err="1" smtClean="0">
                 <a:solidFill>
                   <a:schemeClr val="tx1">
                     <a:lumMod val="75000"/>
@@ -3424,10 +3424,10 @@
                 <a:latin typeface="Helvetica"/>
                 <a:cs typeface="Helvetica"/>
               </a:rPr>
-              <a:t>Juan C. </a:t>
-            </a:r>
-            <a:r>
-              <a:rPr lang="en-US" sz="4800" i="1" dirty="0" err="1" smtClean="0">
+              <a:t>Priscille</a:t>
+            </a:r>
+            <a:r>
+              <a:rPr lang="en-US" sz="4800" i="1" dirty="0" smtClean="0">
                 <a:solidFill>
                   <a:schemeClr val="tx1">
                     <a:lumMod val="75000"/>
@@ -3437,10 +3437,10 @@
                 <a:latin typeface="Helvetica"/>
                 <a:cs typeface="Helvetica"/>
               </a:rPr>
-              <a:t>Prieto</a:t>
-            </a:r>
-            <a:r>
-              <a:rPr lang="en-US" sz="4800" i="1" dirty="0" smtClean="0">
+              <a:t> </a:t>
+            </a:r>
+            <a:r>
+              <a:rPr lang="en-US" sz="4800" i="1" dirty="0">
                 <a:solidFill>
                   <a:schemeClr val="tx1">
                     <a:lumMod val="75000"/>
@@ -3450,10 +3450,10 @@
                 <a:latin typeface="Helvetica"/>
                 <a:cs typeface="Helvetica"/>
               </a:rPr>
-              <a:t>, </a:t>
-            </a:r>
-            <a:r>
-              <a:rPr lang="en-US" sz="4800" i="1" dirty="0">
+              <a:t>de </a:t>
+            </a:r>
+            <a:r>
+              <a:rPr lang="en-US" sz="4800" i="1" dirty="0" smtClean="0">
                 <a:solidFill>
                   <a:schemeClr val="tx1">
                     <a:lumMod val="75000"/>
@@ -3463,10 +3463,10 @@
                 <a:latin typeface="Helvetica"/>
                 <a:cs typeface="Helvetica"/>
               </a:rPr>
-              <a:t>Beatriz </a:t>
-            </a:r>
-            <a:r>
-              <a:rPr lang="en-US" sz="4800" i="1" dirty="0" err="1" smtClean="0">
+              <a:t>Dumast</a:t>
+            </a:r>
+            <a:r>
+              <a:rPr lang="en-US" sz="4800" i="1" baseline="30000" dirty="0" smtClean="0">
                 <a:solidFill>
                   <a:schemeClr val="tx1">
                     <a:lumMod val="75000"/>
@@ -3476,7 +3476,7 @@
                 <a:latin typeface="Helvetica"/>
                 <a:cs typeface="Helvetica"/>
               </a:rPr>
-              <a:t>Paniagua</a:t>
+              <a:t>1</a:t>
             </a:r>
             <a:r>
               <a:rPr lang="en-US" sz="4800" i="1" dirty="0" smtClean="0">
@@ -3502,10 +3502,10 @@
                 <a:latin typeface="Helvetica"/>
                 <a:cs typeface="Helvetica"/>
               </a:rPr>
-              <a:t>Marilia S. </a:t>
-            </a:r>
-            <a:r>
-              <a:rPr lang="en-US" sz="4800" i="1" dirty="0" err="1" smtClean="0">
+              <a:t>Clement </a:t>
+            </a:r>
+            <a:r>
+              <a:rPr lang="en-US" sz="4800" i="1" dirty="0" smtClean="0">
                 <a:solidFill>
                   <a:schemeClr val="tx1">
                     <a:lumMod val="75000"/>
@@ -3515,10 +3515,10 @@
                 <a:latin typeface="Helvetica"/>
                 <a:cs typeface="Helvetica"/>
               </a:rPr>
-              <a:t>Yatabe</a:t>
-            </a:r>
-            <a:r>
-              <a:rPr lang="en-US" sz="4800" i="1" dirty="0" smtClean="0">
+              <a:t>Mirabel</a:t>
+            </a:r>
+            <a:r>
+              <a:rPr lang="en-US" sz="4800" i="1" baseline="30000" dirty="0">
                 <a:solidFill>
                   <a:schemeClr val="tx1">
                     <a:lumMod val="75000"/>
@@ -3528,10 +3528,10 @@
                 <a:latin typeface="Helvetica"/>
                 <a:cs typeface="Helvetica"/>
               </a:rPr>
-              <a:t>, </a:t>
-            </a:r>
-            <a:r>
-              <a:rPr lang="en-US" sz="4800" i="1" dirty="0">
+              <a:t>1</a:t>
+            </a:r>
+            <a:r>
+              <a:rPr lang="en-US" sz="4800" i="1" dirty="0" smtClean="0">
                 <a:solidFill>
                   <a:schemeClr val="tx1">
                     <a:lumMod val="75000"/>
@@ -3541,10 +3541,10 @@
                 <a:latin typeface="Helvetica"/>
                 <a:cs typeface="Helvetica"/>
               </a:rPr>
-              <a:t>Antonio C.O </a:t>
-            </a:r>
-            <a:r>
-              <a:rPr lang="en-US" sz="4800" i="1" dirty="0" err="1" smtClean="0">
+              <a:t>, </a:t>
+            </a:r>
+            <a:r>
+              <a:rPr lang="en-US" sz="4800" i="1" dirty="0">
                 <a:solidFill>
                   <a:schemeClr val="tx1">
                     <a:lumMod val="75000"/>
@@ -3554,7 +3554,7 @@
                 <a:latin typeface="Helvetica"/>
                 <a:cs typeface="Helvetica"/>
               </a:rPr>
-              <a:t>Ruellas</a:t>
+              <a:t>Beatriz </a:t>
             </a:r>
             <a:r>
               <a:rPr lang="en-US" sz="4800" i="1" dirty="0" smtClean="0">
@@ -3567,10 +3567,10 @@
                 <a:latin typeface="Helvetica"/>
                 <a:cs typeface="Helvetica"/>
               </a:rPr>
-              <a:t>, </a:t>
-            </a:r>
-            <a:br>
-              <a:rPr lang="en-US" sz="4800" i="1" dirty="0" smtClean="0">
+              <a:t>Paniagua</a:t>
+            </a:r>
+            <a:r>
+              <a:rPr lang="en-US" sz="4800" i="1" baseline="30000" dirty="0" smtClean="0">
                 <a:solidFill>
                   <a:schemeClr val="tx1">
                     <a:lumMod val="75000"/>
@@ -3580,7 +3580,8 @@
                 <a:latin typeface="Helvetica"/>
                 <a:cs typeface="Helvetica"/>
               </a:rPr>
-            </a:br>
+              <a:t>2</a:t>
+            </a:r>
             <a:r>
               <a:rPr lang="en-US" sz="4800" i="1" dirty="0" smtClean="0">
                 <a:solidFill>
@@ -3592,10 +3593,10 @@
                 <a:latin typeface="Helvetica"/>
                 <a:cs typeface="Helvetica"/>
               </a:rPr>
-              <a:t>Liana </a:t>
-            </a:r>
-            <a:r>
-              <a:rPr lang="en-US" sz="4800" i="1" dirty="0" err="1" smtClean="0">
+              <a:t>, </a:t>
+            </a:r>
+            <a:r>
+              <a:rPr lang="en-US" sz="4800" i="1" dirty="0">
                 <a:solidFill>
                   <a:schemeClr val="tx1">
                     <a:lumMod val="75000"/>
@@ -3605,7 +3606,7 @@
                 <a:latin typeface="Helvetica"/>
                 <a:cs typeface="Helvetica"/>
               </a:rPr>
-              <a:t>Fattori</a:t>
+              <a:t>Marilia </a:t>
             </a:r>
             <a:r>
               <a:rPr lang="en-US" sz="4800" i="1" dirty="0" smtClean="0">
@@ -3618,10 +3619,10 @@
                 <a:latin typeface="Helvetica"/>
                 <a:cs typeface="Helvetica"/>
               </a:rPr>
-              <a:t>, </a:t>
-            </a:r>
-            <a:r>
-              <a:rPr lang="en-US" sz="4800" i="1" dirty="0">
+              <a:t>Yatabe</a:t>
+            </a:r>
+            <a:r>
+              <a:rPr lang="en-US" sz="4800" i="1" baseline="30000" dirty="0">
                 <a:solidFill>
                   <a:schemeClr val="tx1">
                     <a:lumMod val="75000"/>
@@ -3631,7 +3632,7 @@
                 <a:latin typeface="Helvetica"/>
                 <a:cs typeface="Helvetica"/>
               </a:rPr>
-              <a:t>Luciana </a:t>
+              <a:t>1</a:t>
             </a:r>
             <a:r>
               <a:rPr lang="en-US" sz="4800" i="1" dirty="0" smtClean="0">
@@ -3644,7 +3645,7 @@
                 <a:latin typeface="Helvetica"/>
                 <a:cs typeface="Helvetica"/>
               </a:rPr>
-              <a:t>Muniz, </a:t>
+              <a:t>, </a:t>
             </a:r>
             <a:r>
               <a:rPr lang="en-US" sz="4800" i="1" dirty="0">
@@ -3657,10 +3658,10 @@
                 <a:latin typeface="Helvetica"/>
                 <a:cs typeface="Helvetica"/>
               </a:rPr>
-              <a:t>Martin </a:t>
-            </a:r>
-            <a:r>
-              <a:rPr lang="en-US" sz="4800" i="1" dirty="0" err="1" smtClean="0">
+              <a:t>Antonio </a:t>
+            </a:r>
+            <a:r>
+              <a:rPr lang="en-US" sz="4800" i="1" dirty="0" smtClean="0">
                 <a:solidFill>
                   <a:schemeClr val="tx1">
                     <a:lumMod val="75000"/>
@@ -3670,10 +3671,10 @@
                 <a:latin typeface="Helvetica"/>
                 <a:cs typeface="Helvetica"/>
               </a:rPr>
-              <a:t>Styner</a:t>
-            </a:r>
-            <a:r>
-              <a:rPr lang="en-US" sz="4800" i="1" dirty="0" smtClean="0">
+              <a:t>Ruellas</a:t>
+            </a:r>
+            <a:r>
+              <a:rPr lang="en-US" sz="4800" i="1" baseline="30000" dirty="0">
                 <a:solidFill>
                   <a:schemeClr val="tx1">
                     <a:lumMod val="75000"/>
@@ -3683,10 +3684,10 @@
                 <a:latin typeface="Helvetica"/>
                 <a:cs typeface="Helvetica"/>
               </a:rPr>
-              <a:t>, </a:t>
-            </a:r>
-            <a:r>
-              <a:rPr lang="en-US" sz="4800" i="1" dirty="0">
+              <a:t>1</a:t>
+            </a:r>
+            <a:r>
+              <a:rPr lang="en-US" sz="4800" i="1" dirty="0" smtClean="0">
                 <a:solidFill>
                   <a:schemeClr val="tx1">
                     <a:lumMod val="75000"/>
@@ -3696,71 +3697,7 @@
                 <a:latin typeface="Helvetica"/>
                 <a:cs typeface="Helvetica"/>
               </a:rPr>
-              <a:t>and Lucia </a:t>
-            </a:r>
-            <a:r>
-              <a:rPr lang="en-US" sz="4800" i="1" dirty="0" err="1" smtClean="0">
-                <a:solidFill>
-                  <a:schemeClr val="tx1">
-                    <a:lumMod val="75000"/>
-                    <a:lumOff val="25000"/>
-                  </a:schemeClr>
-                </a:solidFill>
-                <a:latin typeface="Helvetica"/>
-                <a:cs typeface="Helvetica"/>
-              </a:rPr>
-              <a:t>Cevidanes</a:t>
-            </a:r>
-            <a:r>
-              <a:rPr lang="en-US" sz="4800" i="1" dirty="0" smtClean="0">
-                <a:solidFill>
-                  <a:schemeClr val="tx1">
-                    <a:lumMod val="75000"/>
-                    <a:lumOff val="25000"/>
-                  </a:schemeClr>
-                </a:solidFill>
-                <a:latin typeface="Helvetica"/>
-                <a:cs typeface="Helvetica"/>
-              </a:rPr>
-              <a:t> </a:t>
-            </a:r>
-            <a:r>
-              <a:rPr lang="en-US" altLang="ja-JP" sz="4800" i="1" dirty="0">
-                <a:solidFill>
-                  <a:schemeClr val="tx1">
-                    <a:lumMod val="75000"/>
-                    <a:lumOff val="25000"/>
-                  </a:schemeClr>
-                </a:solidFill>
-                <a:latin typeface="Helvetica"/>
-                <a:cs typeface="Helvetica"/>
-              </a:rPr>
-              <a:t/>
-            </a:r>
-            <a:br>
-              <a:rPr lang="en-US" altLang="ja-JP" sz="4800" i="1" dirty="0">
-                <a:solidFill>
-                  <a:schemeClr val="tx1">
-                    <a:lumMod val="75000"/>
-                    <a:lumOff val="25000"/>
-                  </a:schemeClr>
-                </a:solidFill>
-                <a:latin typeface="Helvetica"/>
-                <a:cs typeface="Helvetica"/>
-              </a:rPr>
-            </a:br>
-            <a:r>
-              <a:rPr lang="en-US" altLang="ja-JP" sz="4800" i="1" dirty="0" smtClean="0">
-                <a:solidFill>
-                  <a:schemeClr val="tx1">
-                    <a:lumMod val="75000"/>
-                    <a:lumOff val="25000"/>
-                  </a:schemeClr>
-                </a:solidFill>
-                <a:latin typeface="Helvetica"/>
-                <a:cs typeface="Helvetica"/>
-              </a:rPr>
-              <a:t>NIRAL, University of North Carolina, Chapel Hill </a:t>
+              <a:t>,</a:t>
             </a:r>
             <a:endParaRPr lang="en-US" sz="4800" i="1" dirty="0">
               <a:solidFill>
@@ -3773,6 +3710,378 @@
               <a:cs typeface="Helvetica"/>
             </a:endParaRPr>
           </a:p>
+          <a:p>
+            <a:pPr algn="ctr" defTabSz="4596712">
+              <a:defRPr/>
+            </a:pPr>
+            <a:r>
+              <a:rPr lang="en-US" sz="4800" i="1" dirty="0">
+                <a:solidFill>
+                  <a:schemeClr val="tx1">
+                    <a:lumMod val="75000"/>
+                    <a:lumOff val="25000"/>
+                  </a:schemeClr>
+                </a:solidFill>
+                <a:latin typeface="Helvetica"/>
+                <a:cs typeface="Helvetica"/>
+              </a:rPr>
+              <a:t>Nina </a:t>
+            </a:r>
+            <a:r>
+              <a:rPr lang="en-US" sz="4800" i="1" dirty="0" smtClean="0">
+                <a:solidFill>
+                  <a:schemeClr val="tx1">
+                    <a:lumMod val="75000"/>
+                    <a:lumOff val="25000"/>
+                  </a:schemeClr>
+                </a:solidFill>
+                <a:latin typeface="Helvetica"/>
+                <a:cs typeface="Helvetica"/>
+              </a:rPr>
+              <a:t>Tubau</a:t>
+            </a:r>
+            <a:r>
+              <a:rPr lang="en-US" sz="4800" i="1" baseline="30000" dirty="0">
+                <a:solidFill>
+                  <a:schemeClr val="tx1">
+                    <a:lumMod val="75000"/>
+                    <a:lumOff val="25000"/>
+                  </a:schemeClr>
+                </a:solidFill>
+                <a:latin typeface="Helvetica"/>
+                <a:cs typeface="Helvetica"/>
+              </a:rPr>
+              <a:t>1</a:t>
+            </a:r>
+            <a:r>
+              <a:rPr lang="en-US" sz="4800" i="1" dirty="0" smtClean="0">
+                <a:solidFill>
+                  <a:schemeClr val="tx1">
+                    <a:lumMod val="75000"/>
+                    <a:lumOff val="25000"/>
+                  </a:schemeClr>
+                </a:solidFill>
+                <a:latin typeface="Helvetica"/>
+                <a:cs typeface="Helvetica"/>
+              </a:rPr>
+              <a:t>, </a:t>
+            </a:r>
+            <a:r>
+              <a:rPr lang="en-US" sz="4800" i="1" dirty="0">
+                <a:solidFill>
+                  <a:schemeClr val="tx1">
+                    <a:lumMod val="75000"/>
+                    <a:lumOff val="25000"/>
+                  </a:schemeClr>
+                </a:solidFill>
+                <a:latin typeface="Helvetica"/>
+                <a:cs typeface="Helvetica"/>
+              </a:rPr>
+              <a:t>Martin </a:t>
+            </a:r>
+            <a:r>
+              <a:rPr lang="en-US" sz="4800" i="1" dirty="0" smtClean="0">
+                <a:solidFill>
+                  <a:schemeClr val="tx1">
+                    <a:lumMod val="75000"/>
+                    <a:lumOff val="25000"/>
+                  </a:schemeClr>
+                </a:solidFill>
+                <a:latin typeface="Helvetica"/>
+                <a:cs typeface="Helvetica"/>
+              </a:rPr>
+              <a:t>Styner</a:t>
+            </a:r>
+            <a:r>
+              <a:rPr lang="en-US" sz="4800" i="1" baseline="30000" dirty="0">
+                <a:solidFill>
+                  <a:schemeClr val="tx1">
+                    <a:lumMod val="75000"/>
+                    <a:lumOff val="25000"/>
+                  </a:schemeClr>
+                </a:solidFill>
+                <a:latin typeface="Helvetica"/>
+                <a:cs typeface="Helvetica"/>
+              </a:rPr>
+              <a:t>3</a:t>
+            </a:r>
+            <a:r>
+              <a:rPr lang="en-US" sz="4800" i="1" dirty="0" smtClean="0">
+                <a:solidFill>
+                  <a:schemeClr val="tx1">
+                    <a:lumMod val="75000"/>
+                    <a:lumOff val="25000"/>
+                  </a:schemeClr>
+                </a:solidFill>
+                <a:latin typeface="Helvetica"/>
+                <a:cs typeface="Helvetica"/>
+              </a:rPr>
+              <a:t>, </a:t>
+            </a:r>
+            <a:r>
+              <a:rPr lang="en-US" sz="4800" i="1" dirty="0">
+                <a:solidFill>
+                  <a:schemeClr val="tx1">
+                    <a:lumMod val="75000"/>
+                    <a:lumOff val="25000"/>
+                  </a:schemeClr>
+                </a:solidFill>
+                <a:latin typeface="Helvetica"/>
+                <a:cs typeface="Helvetica"/>
+              </a:rPr>
+              <a:t>Lucia </a:t>
+            </a:r>
+            <a:r>
+              <a:rPr lang="en-US" sz="4800" i="1" dirty="0" smtClean="0">
+                <a:solidFill>
+                  <a:schemeClr val="tx1">
+                    <a:lumMod val="75000"/>
+                    <a:lumOff val="25000"/>
+                  </a:schemeClr>
+                </a:solidFill>
+                <a:latin typeface="Helvetica"/>
+                <a:cs typeface="Helvetica"/>
+              </a:rPr>
+              <a:t>Cevidanes</a:t>
+            </a:r>
+            <a:r>
+              <a:rPr lang="en-US" sz="4800" i="1" baseline="30000" dirty="0">
+                <a:solidFill>
+                  <a:schemeClr val="tx1">
+                    <a:lumMod val="75000"/>
+                    <a:lumOff val="25000"/>
+                  </a:schemeClr>
+                </a:solidFill>
+                <a:latin typeface="Helvetica"/>
+                <a:cs typeface="Helvetica"/>
+              </a:rPr>
+              <a:t>1</a:t>
+            </a:r>
+            <a:r>
+              <a:rPr lang="en-US" sz="4800" i="1" dirty="0" smtClean="0">
+                <a:solidFill>
+                  <a:schemeClr val="tx1">
+                    <a:lumMod val="75000"/>
+                    <a:lumOff val="25000"/>
+                  </a:schemeClr>
+                </a:solidFill>
+                <a:latin typeface="Helvetica"/>
+                <a:cs typeface="Helvetica"/>
+              </a:rPr>
+              <a:t>, </a:t>
+            </a:r>
+            <a:r>
+              <a:rPr lang="en-US" sz="4800" i="1" dirty="0">
+                <a:solidFill>
+                  <a:schemeClr val="tx1">
+                    <a:lumMod val="75000"/>
+                    <a:lumOff val="25000"/>
+                  </a:schemeClr>
+                </a:solidFill>
+                <a:latin typeface="Helvetica"/>
+                <a:cs typeface="Helvetica"/>
+              </a:rPr>
+              <a:t>Juan C. </a:t>
+            </a:r>
+            <a:r>
+              <a:rPr lang="en-US" sz="4800" i="1" dirty="0" smtClean="0">
+                <a:solidFill>
+                  <a:schemeClr val="tx1">
+                    <a:lumMod val="75000"/>
+                    <a:lumOff val="25000"/>
+                  </a:schemeClr>
+                </a:solidFill>
+                <a:latin typeface="Helvetica"/>
+                <a:cs typeface="Helvetica"/>
+              </a:rPr>
+              <a:t>Prieto</a:t>
+            </a:r>
+            <a:r>
+              <a:rPr lang="en-US" sz="4800" i="1" baseline="30000" dirty="0" smtClean="0">
+                <a:solidFill>
+                  <a:schemeClr val="tx1">
+                    <a:lumMod val="75000"/>
+                    <a:lumOff val="25000"/>
+                  </a:schemeClr>
+                </a:solidFill>
+                <a:latin typeface="Helvetica"/>
+                <a:cs typeface="Helvetica"/>
+              </a:rPr>
+              <a:t>3</a:t>
+            </a:r>
+            <a:endParaRPr lang="en-US" sz="4800" i="1" dirty="0">
+              <a:solidFill>
+                <a:schemeClr val="tx1">
+                  <a:lumMod val="75000"/>
+                  <a:lumOff val="25000"/>
+                </a:schemeClr>
+              </a:solidFill>
+              <a:latin typeface="Helvetica"/>
+              <a:cs typeface="Helvetica"/>
+            </a:endParaRPr>
+          </a:p>
+          <a:p>
+            <a:pPr algn="ctr" defTabSz="4596712">
+              <a:defRPr/>
+            </a:pPr>
+            <a:r>
+              <a:rPr lang="en-US" sz="4000" i="1" dirty="0" smtClean="0">
+                <a:solidFill>
+                  <a:schemeClr val="tx1">
+                    <a:lumMod val="75000"/>
+                    <a:lumOff val="25000"/>
+                  </a:schemeClr>
+                </a:solidFill>
+                <a:latin typeface="Helvetica"/>
+                <a:cs typeface="Helvetica"/>
+              </a:rPr>
+              <a:t>1. University </a:t>
+            </a:r>
+            <a:r>
+              <a:rPr lang="en-US" sz="4000" i="1" dirty="0">
+                <a:solidFill>
+                  <a:schemeClr val="tx1">
+                    <a:lumMod val="75000"/>
+                    <a:lumOff val="25000"/>
+                  </a:schemeClr>
+                </a:solidFill>
+                <a:latin typeface="Helvetica"/>
+                <a:cs typeface="Helvetica"/>
+              </a:rPr>
+              <a:t>of Michigan, Ann Arbor, United </a:t>
+            </a:r>
+            <a:r>
+              <a:rPr lang="en-US" sz="4000" i="1" dirty="0" smtClean="0">
+                <a:solidFill>
+                  <a:schemeClr val="tx1">
+                    <a:lumMod val="75000"/>
+                    <a:lumOff val="25000"/>
+                  </a:schemeClr>
+                </a:solidFill>
+                <a:latin typeface="Helvetica"/>
+                <a:cs typeface="Helvetica"/>
+              </a:rPr>
+              <a:t>States</a:t>
+            </a:r>
+            <a:endParaRPr lang="en-US" sz="4000" i="1" dirty="0">
+              <a:solidFill>
+                <a:schemeClr val="tx1">
+                  <a:lumMod val="75000"/>
+                  <a:lumOff val="25000"/>
+                </a:schemeClr>
+              </a:solidFill>
+              <a:latin typeface="Helvetica"/>
+              <a:cs typeface="Helvetica"/>
+            </a:endParaRPr>
+          </a:p>
+          <a:p>
+            <a:pPr algn="ctr" defTabSz="4596712">
+              <a:defRPr/>
+            </a:pPr>
+            <a:r>
+              <a:rPr lang="en-US" sz="4000" i="1" dirty="0" smtClean="0">
+                <a:solidFill>
+                  <a:schemeClr val="tx1">
+                    <a:lumMod val="75000"/>
+                    <a:lumOff val="25000"/>
+                  </a:schemeClr>
+                </a:solidFill>
+                <a:latin typeface="Helvetica"/>
+                <a:cs typeface="Helvetica"/>
+              </a:rPr>
+              <a:t>2. </a:t>
+            </a:r>
+            <a:r>
+              <a:rPr lang="en-US" sz="4000" i="1" dirty="0" err="1" smtClean="0">
+                <a:solidFill>
+                  <a:schemeClr val="tx1">
+                    <a:lumMod val="75000"/>
+                    <a:lumOff val="25000"/>
+                  </a:schemeClr>
+                </a:solidFill>
+                <a:latin typeface="Helvetica"/>
+                <a:cs typeface="Helvetica"/>
+              </a:rPr>
+              <a:t>Kitware</a:t>
+            </a:r>
+            <a:r>
+              <a:rPr lang="en-US" sz="4000" i="1" dirty="0">
+                <a:solidFill>
+                  <a:schemeClr val="tx1">
+                    <a:lumMod val="75000"/>
+                    <a:lumOff val="25000"/>
+                  </a:schemeClr>
+                </a:solidFill>
+                <a:latin typeface="Helvetica"/>
+                <a:cs typeface="Helvetica"/>
+              </a:rPr>
+              <a:t>, Carrboro, United States</a:t>
+            </a:r>
+            <a:r>
+              <a:rPr lang="en-US" sz="4000" i="1" dirty="0" smtClean="0">
+                <a:solidFill>
+                  <a:schemeClr val="tx1">
+                    <a:lumMod val="75000"/>
+                    <a:lumOff val="25000"/>
+                  </a:schemeClr>
+                </a:solidFill>
+                <a:latin typeface="Helvetica"/>
+                <a:cs typeface="Helvetica"/>
+              </a:rPr>
+              <a:t>;</a:t>
+            </a:r>
+            <a:endParaRPr lang="en-US" sz="4000" i="1" dirty="0">
+              <a:solidFill>
+                <a:schemeClr val="tx1">
+                  <a:lumMod val="75000"/>
+                  <a:lumOff val="25000"/>
+                </a:schemeClr>
+              </a:solidFill>
+              <a:latin typeface="Helvetica"/>
+              <a:cs typeface="Helvetica"/>
+            </a:endParaRPr>
+          </a:p>
+          <a:p>
+            <a:pPr algn="ctr" defTabSz="4596712">
+              <a:defRPr/>
+            </a:pPr>
+            <a:r>
+              <a:rPr lang="en-US" sz="4000" i="1" dirty="0" smtClean="0">
+                <a:solidFill>
+                  <a:schemeClr val="tx1">
+                    <a:lumMod val="75000"/>
+                    <a:lumOff val="25000"/>
+                  </a:schemeClr>
+                </a:solidFill>
+                <a:latin typeface="Helvetica"/>
+                <a:cs typeface="Helvetica"/>
+              </a:rPr>
+              <a:t>3. University </a:t>
+            </a:r>
+            <a:r>
+              <a:rPr lang="en-US" sz="4000" i="1" dirty="0">
+                <a:solidFill>
+                  <a:schemeClr val="tx1">
+                    <a:lumMod val="75000"/>
+                    <a:lumOff val="25000"/>
+                  </a:schemeClr>
+                </a:solidFill>
+                <a:latin typeface="Helvetica"/>
+                <a:cs typeface="Helvetica"/>
+              </a:rPr>
+              <a:t>of North Carolina, Chapel Hill, United States</a:t>
+            </a:r>
+            <a:endParaRPr lang="en-US" sz="4000" i="1" dirty="0">
+              <a:solidFill>
+                <a:schemeClr val="tx1">
+                  <a:lumMod val="75000"/>
+                  <a:lumOff val="25000"/>
+                </a:schemeClr>
+              </a:solidFill>
+              <a:latin typeface="Helvetica"/>
+              <a:cs typeface="Helvetica"/>
+            </a:endParaRPr>
+          </a:p>
         </p:txBody>
       </p:sp>
       <p:sp>
@@ -3785,7 +4094,7 @@
         </p:nvSpPr>
         <p:spPr bwMode="auto">
           <a:xfrm>
-            <a:off x="13206555" y="13830891"/>
+            <a:off x="13206555" y="13059495"/>
             <a:ext cx="10160000" cy="1116013"/>
           </a:xfrm>
           <a:prstGeom prst="rect">
@@ -4127,7 +4436,7 @@
         </p:nvSpPr>
         <p:spPr bwMode="auto">
           <a:xfrm>
-            <a:off x="25907589" y="13803692"/>
+            <a:off x="25810660" y="13652638"/>
             <a:ext cx="10160000" cy="1116013"/>
           </a:xfrm>
           <a:prstGeom prst="rect">
@@ -4298,7 +4607,7 @@
         </p:nvSpPr>
         <p:spPr bwMode="auto">
           <a:xfrm>
-            <a:off x="25395459" y="21714104"/>
+            <a:off x="25810660" y="23102132"/>
             <a:ext cx="10160000" cy="1116013"/>
           </a:xfrm>
           <a:prstGeom prst="rect">
@@ -4694,7 +5003,7 @@
         </p:nvSpPr>
         <p:spPr bwMode="auto">
           <a:xfrm>
-            <a:off x="1" y="38004750"/>
+            <a:off x="1" y="38357520"/>
             <a:ext cx="36576000" cy="171450"/>
           </a:xfrm>
           <a:prstGeom prst="rect">
@@ -4784,7 +5093,17 @@
                 <a:latin typeface="Helvetica" charset="0"/>
                 <a:cs typeface="Helvetica" charset="0"/>
               </a:rPr>
-              <a:t>2017 University of North Carolina</a:t>
+              <a:t>2018 </a:t>
+            </a:r>
+            <a:r>
+              <a:rPr lang="en-US" sz="3600" b="1" i="1" dirty="0" smtClean="0">
+                <a:solidFill>
+                  <a:srgbClr val="0D0C0C"/>
+                </a:solidFill>
+                <a:latin typeface="Helvetica" charset="0"/>
+                <a:cs typeface="Helvetica" charset="0"/>
+              </a:rPr>
+              <a:t>University of North Carolina</a:t>
             </a:r>
             <a:endParaRPr lang="en-US" sz="3600" b="1" i="1" dirty="0">
               <a:solidFill>
@@ -4798,50 +5117,6 @@
       </p:sp>
       <p:sp>
         <p:nvSpPr>
-          <p:cNvPr id="17" name="Rectangle 49"/>
-          <p:cNvSpPr>
-            <a:spLocks noChangeArrowheads="1"/>
-          </p:cNvSpPr>
-          <p:nvPr/>
-        </p:nvSpPr>
-        <p:spPr bwMode="auto">
-          <a:xfrm>
-            <a:off x="25805937" y="23111393"/>
-            <a:ext cx="9209952" cy="45719"/>
-          </a:xfrm>
-          <a:prstGeom prst="rect">
-            <a:avLst/>
-          </a:prstGeom>
-          <a:solidFill>
-            <a:srgbClr val="2163A1"/>
-          </a:solidFill>
-          <a:ln>
-            <a:noFill/>
-          </a:ln>
-          <a:extLst>
-            <a:ext uri="{91240B29-F687-4f45-9708-019B960494DF}">
-              <a14:hiddenLine xmlns:a14="http://schemas.microsoft.com/office/drawing/2010/main" w="9525">
-                <a:solidFill>
-                  <a:srgbClr val="000000"/>
-                </a:solidFill>
-                <a:round/>
-                <a:headEnd/>
-                <a:tailEnd/>
-              </a14:hiddenLine>
-            </a:ext>
-          </a:extLst>
-        </p:spPr>
-        <p:txBody>
-          <a:bodyPr/>
-          <a:lstStyle/>
-          <a:p>
-            <a:pPr defTabSz="2193925"/>
-            <a:endParaRPr lang="en-US" sz="10600"/>
-          </a:p>
-        </p:txBody>
-      </p:sp>
-      <p:sp>
-        <p:nvSpPr>
           <p:cNvPr id="18" name="Rectangle 50"/>
           <p:cNvSpPr>
             <a:spLocks noChangeArrowheads="1"/>
@@ -4850,7 +5125,7 @@
         </p:nvSpPr>
         <p:spPr bwMode="auto">
           <a:xfrm>
-            <a:off x="25810660" y="15085922"/>
+            <a:off x="25810660" y="14920265"/>
             <a:ext cx="10160000" cy="98425"/>
           </a:xfrm>
           <a:prstGeom prst="rect">
@@ -4894,7 +5169,7 @@
         </p:nvSpPr>
         <p:spPr bwMode="auto">
           <a:xfrm>
-            <a:off x="13297273" y="15049273"/>
+            <a:off x="13297273" y="14277877"/>
             <a:ext cx="10160000" cy="98425"/>
           </a:xfrm>
           <a:prstGeom prst="rect">
@@ -4982,7 +5257,7 @@
         </p:nvSpPr>
         <p:spPr bwMode="auto">
           <a:xfrm>
-            <a:off x="1" y="5040315"/>
+            <a:off x="1" y="5004816"/>
             <a:ext cx="36576000" cy="446087"/>
           </a:xfrm>
           <a:prstGeom prst="rect">
@@ -5083,7 +5358,7 @@
         </p:nvCxnSpPr>
         <p:spPr bwMode="auto">
           <a:xfrm>
-            <a:off x="12333110" y="6207125"/>
+            <a:off x="12242392" y="6207125"/>
             <a:ext cx="0" cy="31089600"/>
           </a:xfrm>
           <a:prstGeom prst="line">
@@ -5117,7 +5392,7 @@
         </p:nvCxnSpPr>
         <p:spPr bwMode="auto">
           <a:xfrm>
-            <a:off x="24384000" y="6207125"/>
+            <a:off x="24610795" y="6207125"/>
             <a:ext cx="71818" cy="31054675"/>
           </a:xfrm>
           <a:prstGeom prst="line">
@@ -5157,7 +5432,7 @@
         </p:blipFill>
         <p:spPr>
           <a:xfrm>
-            <a:off x="29970616" y="228603"/>
+            <a:off x="30633244" y="228603"/>
             <a:ext cx="5633190" cy="4460379"/>
           </a:xfrm>
           <a:prstGeom prst="rect">
@@ -5193,7 +5468,7 @@
         </p:blipFill>
         <p:spPr>
           <a:xfrm>
-            <a:off x="1276530" y="-116396"/>
+            <a:off x="558683" y="-116396"/>
             <a:ext cx="4220271" cy="5036802"/>
           </a:xfrm>
           <a:prstGeom prst="rect">
@@ -5251,8 +5526,8 @@
         </p:nvSpPr>
         <p:spPr>
           <a:xfrm>
-            <a:off x="12676436" y="10304438"/>
-            <a:ext cx="11338468" cy="3031163"/>
+            <a:off x="12676436" y="9783532"/>
+            <a:ext cx="11338468" cy="3275963"/>
           </a:xfrm>
           <a:prstGeom prst="roundRect">
             <a:avLst/>
@@ -5340,24 +5615,26 @@
                 <a:latin typeface="Helvetica" charset="0"/>
                 <a:cs typeface="Helvetica" charset="0"/>
               </a:rPr>
-              <a:t>shape analysis tool using deep learning. </a:t>
-            </a:r>
-          </a:p>
-        </p:txBody>
-      </p:sp>
-      <p:sp>
-        <p:nvSpPr>
-          <p:cNvPr id="94" name="Rounded Rectangle 93"/>
+              <a:t>shape analysis tool using deep learning to assess disease progression. </a:t>
+            </a:r>
+          </a:p>
+        </p:txBody>
+      </p:sp>
+      <p:sp>
+        <p:nvSpPr>
+          <p:cNvPr id="96" name="Rounded Rectangle 95"/>
           <p:cNvSpPr/>
           <p:nvPr/>
         </p:nvSpPr>
         <p:spPr>
           <a:xfrm>
-            <a:off x="24948444" y="23750122"/>
-            <a:ext cx="11119145" cy="6164907"/>
+            <a:off x="24948445" y="32037783"/>
+            <a:ext cx="11089126" cy="5960617"/>
           </a:xfrm>
           <a:prstGeom prst="roundRect">
-            <a:avLst/>
+            <a:avLst>
+              <a:gd name="adj" fmla="val 4567"/>
+            </a:avLst>
           </a:prstGeom>
         </p:spPr>
         <p:style>
@@ -5378,335 +5655,397 @@
           <a:bodyPr rtlCol="0" anchor="ctr"/>
           <a:lstStyle/>
           <a:p>
-            <a:endParaRPr lang="en-US" sz="3600" dirty="0">
-              <a:latin typeface="Helvetica" charset="0"/>
-              <a:cs typeface="Helvetica" charset="0"/>
-            </a:endParaRPr>
-          </a:p>
-        </p:txBody>
-      </p:sp>
-      <p:sp>
-        <p:nvSpPr>
-          <p:cNvPr id="96" name="Rounded Rectangle 95"/>
-          <p:cNvSpPr/>
-          <p:nvPr/>
-        </p:nvSpPr>
-        <p:spPr>
-          <a:xfrm>
-            <a:off x="24948445" y="32313878"/>
-            <a:ext cx="11089126" cy="4982847"/>
-          </a:xfrm>
-          <a:prstGeom prst="roundRect">
-            <a:avLst/>
-          </a:prstGeom>
-        </p:spPr>
-        <p:style>
-          <a:lnRef idx="2">
-            <a:schemeClr val="accent1"/>
-          </a:lnRef>
-          <a:fillRef idx="1">
-            <a:schemeClr val="lt1"/>
-          </a:fillRef>
-          <a:effectRef idx="0">
-            <a:schemeClr val="accent1"/>
-          </a:effectRef>
-          <a:fontRef idx="minor">
-            <a:schemeClr val="dk1"/>
-          </a:fontRef>
-        </p:style>
-        <p:txBody>
-          <a:bodyPr rtlCol="0" anchor="ctr"/>
-          <a:lstStyle/>
-          <a:p>
-            <a:r>
-              <a:rPr lang="en-US" sz="2400" baseline="30000" dirty="0"/>
-              <a:t>[1] Collaboration, O. S. et al., “Estimating the reproducibility of psychological science,” Science 349(6251), aac4716 (2015).</a:t>
-            </a:r>
-          </a:p>
-          <a:p>
-            <a:r>
-              <a:rPr lang="en-US" sz="2400" baseline="30000" dirty="0"/>
-              <a:t>[2] DB, T., J, B., C, B., and et al, “Sharing clinical trial data: A proposal from the international committee of medical journal editors,” JAMA 315(5), 467–468 (2016).</a:t>
-            </a:r>
-          </a:p>
-          <a:p>
-            <a:r>
-              <a:rPr lang="en-US" sz="2400" baseline="30000" dirty="0"/>
+            <a:r>
+              <a:rPr lang="en-US" sz="1800" dirty="0"/>
+              <a:t>[1] </a:t>
+            </a:r>
+            <a:r>
+              <a:rPr lang="en-US" sz="1800" dirty="0" err="1"/>
+              <a:t>Yushkevich</a:t>
+            </a:r>
+            <a:r>
+              <a:rPr lang="en-US" sz="1800" dirty="0"/>
+              <a:t>, P. A., </a:t>
+            </a:r>
+            <a:r>
+              <a:rPr lang="en-US" sz="1800" dirty="0" err="1"/>
+              <a:t>Piven</a:t>
+            </a:r>
+            <a:r>
+              <a:rPr lang="en-US" sz="1800" dirty="0"/>
+              <a:t>, J., Cody </a:t>
+            </a:r>
+            <a:r>
+              <a:rPr lang="en-US" sz="1800" dirty="0" err="1"/>
+              <a:t>Hazlett</a:t>
+            </a:r>
+            <a:r>
+              <a:rPr lang="en-US" sz="1800" dirty="0"/>
+              <a:t>, H., </a:t>
+            </a:r>
+            <a:r>
+              <a:rPr lang="en-US" sz="1800" dirty="0" err="1"/>
+              <a:t>Gimpel</a:t>
+            </a:r>
+            <a:r>
+              <a:rPr lang="en-US" sz="1800" dirty="0"/>
+              <a:t> Smith, R., Ho, S., Gee, J. C. and </a:t>
+            </a:r>
+            <a:r>
+              <a:rPr lang="en-US" sz="1800" dirty="0" err="1"/>
+              <a:t>Gerig</a:t>
+            </a:r>
+            <a:r>
+              <a:rPr lang="en-US" sz="1800" dirty="0"/>
+              <a:t>, G., “User-Guided 3D Active Contour Segmentation of Anatomical Structures: Significantly Improved Efficiency and Reliability,” </a:t>
+            </a:r>
+            <a:r>
+              <a:rPr lang="en-US" sz="1800" dirty="0" err="1"/>
+              <a:t>Neuroimage</a:t>
+            </a:r>
+            <a:r>
+              <a:rPr lang="en-US" sz="1800" dirty="0"/>
+              <a:t> 31(3), 1116–1128 (2006).</a:t>
+            </a:r>
+          </a:p>
+          <a:p>
+            <a:r>
+              <a:rPr lang="en-US" sz="1800" dirty="0"/>
+              <a:t>[2] </a:t>
+            </a:r>
+            <a:r>
+              <a:rPr lang="en-US" sz="1800" dirty="0" err="1"/>
+              <a:t>Japkowicz</a:t>
+            </a:r>
+            <a:r>
+              <a:rPr lang="en-US" sz="1800" dirty="0"/>
+              <a:t>, N. and Stephen, S., “The class imbalance problem: A systematic study,” Intelligent data analysis 6(5), 429–449 (2002).</a:t>
+            </a:r>
+          </a:p>
+          <a:p>
+            <a:r>
+              <a:rPr lang="en-US" sz="1800" dirty="0"/>
               <a:t>[3] </a:t>
             </a:r>
             <a:r>
-              <a:rPr lang="en-US" sz="2400" baseline="30000" dirty="0" err="1"/>
-              <a:t>Krishnankutty</a:t>
-            </a:r>
-            <a:r>
-              <a:rPr lang="en-US" sz="2400" baseline="30000" dirty="0"/>
-              <a:t>, B., Bellary, S., Kumar, N. B., and </a:t>
-            </a:r>
-            <a:r>
-              <a:rPr lang="en-US" sz="2400" baseline="30000" dirty="0" err="1"/>
-              <a:t>Moodahadu</a:t>
-            </a:r>
-            <a:r>
-              <a:rPr lang="en-US" sz="2400" baseline="30000" dirty="0"/>
-              <a:t>, L. S., “Data management in clinical research: An overview,” Indian Journal of Pharmacology 44(2), 168–172 (2012).</a:t>
-            </a:r>
-          </a:p>
-          <a:p>
-            <a:r>
-              <a:rPr lang="en-US" sz="2400" baseline="30000" dirty="0"/>
+              <a:rPr lang="en-US" sz="1800" dirty="0" err="1"/>
+              <a:t>Kalladka</a:t>
+            </a:r>
+            <a:r>
+              <a:rPr lang="en-US" sz="1800" dirty="0"/>
+              <a:t>, M., </a:t>
+            </a:r>
+            <a:r>
+              <a:rPr lang="en-US" sz="1800" dirty="0" err="1"/>
+              <a:t>Quek</a:t>
+            </a:r>
+            <a:r>
+              <a:rPr lang="en-US" sz="1800" dirty="0"/>
+              <a:t>, S., Heir, G., </a:t>
+            </a:r>
+            <a:r>
+              <a:rPr lang="en-US" sz="1800" dirty="0" err="1"/>
+              <a:t>Eliav</a:t>
+            </a:r>
+            <a:r>
+              <a:rPr lang="en-US" sz="1800" dirty="0"/>
+              <a:t>, E., </a:t>
+            </a:r>
+            <a:r>
+              <a:rPr lang="en-US" sz="1800" dirty="0" err="1"/>
+              <a:t>Mupparapu</a:t>
+            </a:r>
+            <a:r>
+              <a:rPr lang="en-US" sz="1800" dirty="0"/>
+              <a:t>, M. and </a:t>
+            </a:r>
+            <a:r>
+              <a:rPr lang="en-US" sz="1800" dirty="0" err="1"/>
+              <a:t>Viswanath</a:t>
+            </a:r>
+            <a:r>
+              <a:rPr lang="en-US" sz="1800" dirty="0"/>
+              <a:t>, A., “</a:t>
+            </a:r>
+            <a:r>
+              <a:rPr lang="en-US" sz="1800" dirty="0" err="1"/>
+              <a:t>Temporomandibular</a:t>
+            </a:r>
+            <a:r>
+              <a:rPr lang="en-US" sz="1800" dirty="0"/>
+              <a:t> joint osteoarthritis: diagnosis and long-term conservative management: a topic review,” The Journal of Indian </a:t>
+            </a:r>
+            <a:r>
+              <a:rPr lang="en-US" sz="1800" dirty="0" err="1"/>
+              <a:t>Prosthodontic</a:t>
+            </a:r>
+            <a:r>
+              <a:rPr lang="en-US" sz="1800" dirty="0"/>
+              <a:t> Society 14(1), 6–15 (2014).</a:t>
+            </a:r>
+          </a:p>
+          <a:p>
+            <a:r>
+              <a:rPr lang="en-US" sz="1800" dirty="0"/>
               <a:t>[4] </a:t>
             </a:r>
             <a:r>
-              <a:rPr lang="en-US" sz="2400" baseline="30000" dirty="0" err="1"/>
+              <a:rPr lang="en-US" sz="1800" dirty="0" err="1"/>
+              <a:t>Chawla</a:t>
+            </a:r>
+            <a:r>
+              <a:rPr lang="en-US" sz="1800" dirty="0"/>
+              <a:t>, N. V., Bowyer, K. W., Hall, L. O. and </a:t>
+            </a:r>
+            <a:r>
+              <a:rPr lang="en-US" sz="1800" dirty="0" err="1"/>
+              <a:t>Kegelmeyer</a:t>
+            </a:r>
+            <a:r>
+              <a:rPr lang="en-US" sz="1800" dirty="0"/>
+              <a:t>, W. P., “SMOTE: synthetic minority over-sampling technique,” Journal of artificial intelligence research 16, 321–357 (2002).</a:t>
+            </a:r>
+          </a:p>
+          <a:p>
+            <a:r>
+              <a:rPr lang="en-US" sz="1800" dirty="0"/>
+              <a:t>[5] </a:t>
+            </a:r>
+            <a:r>
+              <a:rPr lang="en-US" sz="1800" dirty="0" err="1"/>
               <a:t>Cevidanes</a:t>
             </a:r>
             <a:r>
-              <a:rPr lang="en-US" sz="2400" baseline="30000" dirty="0"/>
+              <a:rPr lang="en-US" sz="1800" dirty="0"/>
               <a:t>, L., </a:t>
             </a:r>
             <a:r>
-              <a:rPr lang="en-US" sz="2400" baseline="30000" dirty="0" err="1"/>
+              <a:rPr lang="en-US" sz="1800" dirty="0" err="1"/>
               <a:t>Hajati</a:t>
             </a:r>
             <a:r>
-              <a:rPr lang="en-US" sz="2400" baseline="30000" dirty="0"/>
+              <a:rPr lang="en-US" sz="1800" dirty="0"/>
               <a:t>, A.-K., </a:t>
             </a:r>
             <a:r>
-              <a:rPr lang="en-US" sz="2400" baseline="30000" dirty="0" err="1"/>
+              <a:rPr lang="en-US" sz="1800" dirty="0" err="1"/>
               <a:t>Paniagua</a:t>
             </a:r>
             <a:r>
-              <a:rPr lang="en-US" sz="2400" baseline="30000" dirty="0"/>
+              <a:rPr lang="en-US" sz="1800" dirty="0"/>
               <a:t>, B., Lim, P., Walker, D., </a:t>
             </a:r>
             <a:r>
-              <a:rPr lang="en-US" sz="2400" baseline="30000" dirty="0" err="1"/>
+              <a:rPr lang="en-US" sz="1800" dirty="0" err="1"/>
               <a:t>Palconet</a:t>
             </a:r>
             <a:r>
-              <a:rPr lang="en-US" sz="2400" baseline="30000" dirty="0"/>
+              <a:rPr lang="en-US" sz="1800" dirty="0"/>
               <a:t>, G., </a:t>
             </a:r>
             <a:r>
-              <a:rPr lang="en-US" sz="2400" baseline="30000" dirty="0" err="1"/>
+              <a:rPr lang="en-US" sz="1800" dirty="0" err="1"/>
               <a:t>Nackley</a:t>
             </a:r>
             <a:r>
-              <a:rPr lang="en-US" sz="2400" baseline="30000" dirty="0"/>
+              <a:rPr lang="en-US" sz="1800" dirty="0"/>
               <a:t>, A., </a:t>
             </a:r>
             <a:r>
-              <a:rPr lang="en-US" sz="2400" baseline="30000" dirty="0" err="1"/>
+              <a:rPr lang="en-US" sz="1800" dirty="0" err="1"/>
               <a:t>Styner</a:t>
             </a:r>
             <a:r>
-              <a:rPr lang="en-US" sz="2400" baseline="30000" dirty="0"/>
-              <a:t>, M., Ludlow, J., Zhu, H., and Phillips, C., “Quantification of condylar </a:t>
-            </a:r>
-            <a:r>
-              <a:rPr lang="en-US" sz="2400" baseline="30000" dirty="0" err="1"/>
+              <a:rPr lang="en-US" sz="1800" dirty="0"/>
+              <a:t>, M., Ludlow, J., Zhu, H. and others., “Quantification of condylar </a:t>
+            </a:r>
+            <a:r>
+              <a:rPr lang="en-US" sz="1800" dirty="0" err="1"/>
               <a:t>resorption</a:t>
             </a:r>
             <a:r>
-              <a:rPr lang="en-US" sz="2400" baseline="30000" dirty="0"/>
+              <a:rPr lang="en-US" sz="1800" dirty="0"/>
               <a:t> in </a:t>
             </a:r>
             <a:r>
-              <a:rPr lang="en-US" sz="2400" baseline="30000" dirty="0" err="1"/>
+              <a:rPr lang="en-US" sz="1800" dirty="0" err="1"/>
               <a:t>temporomandibular</a:t>
             </a:r>
             <a:r>
-              <a:rPr lang="en-US" sz="2400" baseline="30000" dirty="0"/>
+              <a:rPr lang="en-US" sz="1800" dirty="0"/>
               <a:t> joint osteoarthritis,” Oral Surgery, Oral Medicine, Oral Pathology, Oral Radiology, and </a:t>
             </a:r>
             <a:r>
-              <a:rPr lang="en-US" sz="2400" baseline="30000" dirty="0" err="1"/>
+              <a:rPr lang="en-US" sz="1800" dirty="0" err="1"/>
               <a:t>Endodontology</a:t>
             </a:r>
             <a:r>
-              <a:rPr lang="en-US" sz="2400" baseline="30000" dirty="0"/>
-              <a:t> 110(1), 110 – 117 (2010).</a:t>
-            </a:r>
-          </a:p>
-          <a:p>
-            <a:r>
-              <a:rPr lang="en-US" sz="2400" baseline="30000" dirty="0"/>
-              <a:t>[5] </a:t>
-            </a:r>
-            <a:r>
-              <a:rPr lang="en-US" sz="2400" baseline="30000" dirty="0" err="1"/>
+              <a:rPr lang="en-US" sz="1800" dirty="0"/>
+              <a:t> 110(1), 110–117 (2010).</a:t>
+            </a:r>
+          </a:p>
+          <a:p>
+            <a:r>
+              <a:rPr lang="en-US" sz="1800" dirty="0"/>
+              <a:t>[6] </a:t>
+            </a:r>
+            <a:r>
+              <a:rPr lang="en-US" sz="1800" dirty="0" err="1"/>
+              <a:t>Lyu</a:t>
+            </a:r>
+            <a:r>
+              <a:rPr lang="en-US" sz="1800" dirty="0"/>
+              <a:t>, I., Kim, S. H., </a:t>
+            </a:r>
+            <a:r>
+              <a:rPr lang="en-US" sz="1800" dirty="0" err="1"/>
+              <a:t>Seong</a:t>
+            </a:r>
+            <a:r>
+              <a:rPr lang="en-US" sz="1800" dirty="0"/>
+              <a:t>, J.-K., </a:t>
+            </a:r>
+            <a:r>
+              <a:rPr lang="en-US" sz="1800" dirty="0" err="1"/>
+              <a:t>Yoo</a:t>
+            </a:r>
+            <a:r>
+              <a:rPr lang="en-US" sz="1800" dirty="0"/>
+              <a:t>, S. W., Evans, A. C., Shi, Y., Sanchez, M., </a:t>
+            </a:r>
+            <a:r>
+              <a:rPr lang="en-US" sz="1800" dirty="0" err="1"/>
+              <a:t>Niethammer</a:t>
+            </a:r>
+            <a:r>
+              <a:rPr lang="en-US" sz="1800" dirty="0"/>
+              <a:t>, M. and </a:t>
+            </a:r>
+            <a:r>
+              <a:rPr lang="en-US" sz="1800" dirty="0" err="1"/>
+              <a:t>Styner</a:t>
+            </a:r>
+            <a:r>
+              <a:rPr lang="en-US" sz="1800" dirty="0"/>
+              <a:t>, M. A., “Group-wise cortical correspondence via </a:t>
+            </a:r>
+            <a:r>
+              <a:rPr lang="en-US" sz="1800" dirty="0" err="1"/>
+              <a:t>sulcal</a:t>
+            </a:r>
+            <a:r>
+              <a:rPr lang="en-US" sz="1800" dirty="0"/>
+              <a:t> curve-constrained entropy minimization,” Information processing in medical imaging: proceedings of the... conference 23, 364, NIH Public Access (2013).</a:t>
+            </a:r>
+          </a:p>
+          <a:p>
+            <a:r>
+              <a:rPr lang="en-US" sz="1800" dirty="0"/>
+              <a:t>[7] </a:t>
+            </a:r>
+            <a:r>
+              <a:rPr lang="en-US" sz="1800" dirty="0" err="1"/>
+              <a:t>Styner</a:t>
+            </a:r>
+            <a:r>
+              <a:rPr lang="en-US" sz="1800" dirty="0"/>
+              <a:t>, M., </a:t>
+            </a:r>
+            <a:r>
+              <a:rPr lang="en-US" sz="1800" dirty="0" err="1"/>
+              <a:t>Oguz</a:t>
+            </a:r>
+            <a:r>
+              <a:rPr lang="en-US" sz="1800" dirty="0"/>
+              <a:t>, I., </a:t>
+            </a:r>
+            <a:r>
+              <a:rPr lang="en-US" sz="1800" dirty="0" err="1"/>
+              <a:t>Xu</a:t>
+            </a:r>
+            <a:r>
+              <a:rPr lang="en-US" sz="1800" dirty="0"/>
+              <a:t>, S., </a:t>
+            </a:r>
+            <a:r>
+              <a:rPr lang="en-US" sz="1800" dirty="0" err="1"/>
+              <a:t>Brechbühler</a:t>
+            </a:r>
+            <a:r>
+              <a:rPr lang="en-US" sz="1800" dirty="0"/>
+              <a:t>, C., </a:t>
+            </a:r>
+            <a:r>
+              <a:rPr lang="en-US" sz="1800" dirty="0" err="1"/>
+              <a:t>Pantazis</a:t>
+            </a:r>
+            <a:r>
+              <a:rPr lang="en-US" sz="1800" dirty="0"/>
+              <a:t>, D., Levitt, J. J., </a:t>
+            </a:r>
+            <a:r>
+              <a:rPr lang="en-US" sz="1800" dirty="0" err="1"/>
+              <a:t>Shenton</a:t>
+            </a:r>
+            <a:r>
+              <a:rPr lang="en-US" sz="1800" dirty="0"/>
+              <a:t>, M. E. and </a:t>
+            </a:r>
+            <a:r>
+              <a:rPr lang="en-US" sz="1800" dirty="0" err="1"/>
+              <a:t>Gerig</a:t>
+            </a:r>
+            <a:r>
+              <a:rPr lang="en-US" sz="1800" dirty="0"/>
+              <a:t>, G., “Framework for the statistical shape analysis of brain structures using SPHARM-PDM,” The insight journal(1071), 242 (2006).</a:t>
+            </a:r>
+          </a:p>
+          <a:p>
+            <a:r>
+              <a:rPr lang="en-US" sz="1800" dirty="0"/>
+              <a:t>[8] </a:t>
+            </a:r>
+            <a:r>
+              <a:rPr lang="en-US" sz="1800" dirty="0" err="1"/>
               <a:t>Paniagua</a:t>
             </a:r>
             <a:r>
-              <a:rPr lang="en-US" sz="2400" baseline="30000" dirty="0"/>
+              <a:rPr lang="en-US" sz="1800" dirty="0"/>
               <a:t>, B., </a:t>
             </a:r>
             <a:r>
-              <a:rPr lang="en-US" sz="2400" baseline="30000" dirty="0" err="1"/>
+              <a:rPr lang="en-US" sz="1800" dirty="0" err="1"/>
               <a:t>Cevidanes</a:t>
             </a:r>
             <a:r>
-              <a:rPr lang="en-US" sz="2400" baseline="30000" dirty="0"/>
+              <a:rPr lang="en-US" sz="1800" dirty="0"/>
               <a:t>, L., Walker, D., Zhu, H., </a:t>
             </a:r>
             <a:r>
-              <a:rPr lang="en-US" sz="2400" baseline="30000" dirty="0" err="1"/>
+              <a:rPr lang="en-US" sz="1800" dirty="0" err="1"/>
               <a:t>Guo</a:t>
             </a:r>
             <a:r>
-              <a:rPr lang="en-US" sz="2400" baseline="30000" dirty="0"/>
-              <a:t>, R., and </a:t>
-            </a:r>
-            <a:r>
-              <a:rPr lang="en-US" sz="2400" baseline="30000" dirty="0" err="1"/>
+              <a:rPr lang="en-US" sz="1800" dirty="0"/>
+              <a:t>, R. and </a:t>
+            </a:r>
+            <a:r>
+              <a:rPr lang="en-US" sz="1800" dirty="0" err="1"/>
               <a:t>Styner</a:t>
             </a:r>
             <a:r>
-              <a:rPr lang="en-US" sz="2400" baseline="30000" dirty="0"/>
-              <a:t>, M., “Clinical application of </a:t>
-            </a:r>
-            <a:r>
-              <a:rPr lang="en-US" sz="2400" baseline="30000" dirty="0" err="1"/>
-              <a:t>spharm</a:t>
-            </a:r>
-            <a:r>
-              <a:rPr lang="en-US" sz="2400" baseline="30000" dirty="0"/>
-              <a:t>- </a:t>
-            </a:r>
-            <a:r>
-              <a:rPr lang="en-US" sz="2400" baseline="30000" dirty="0" err="1"/>
-              <a:t>pdm</a:t>
-            </a:r>
-            <a:r>
-              <a:rPr lang="en-US" sz="2400" baseline="30000" dirty="0"/>
-              <a:t> to quantify </a:t>
-            </a:r>
-            <a:r>
-              <a:rPr lang="en-US" sz="2400" baseline="30000" dirty="0" err="1"/>
+              <a:rPr lang="en-US" sz="1800" dirty="0"/>
+              <a:t>, M., “Clinical application of SPHARM-PDM to quantify </a:t>
+            </a:r>
+            <a:r>
+              <a:rPr lang="en-US" sz="1800" dirty="0" err="1"/>
               <a:t>temporomandibular</a:t>
             </a:r>
             <a:r>
-              <a:rPr lang="en-US" sz="2400" baseline="30000" dirty="0"/>
-              <a:t> joint osteoarthritis,” Computerized Medical Imaging and Graphics 35(5), 345 – 352 (2011).</a:t>
-            </a:r>
-          </a:p>
-          <a:p>
-            <a:r>
-              <a:rPr lang="en-US" sz="2400" baseline="30000" dirty="0"/>
-              <a:t>[6] </a:t>
-            </a:r>
-            <a:r>
-              <a:rPr lang="en-US" sz="2400" baseline="30000" dirty="0" err="1"/>
-              <a:t>Danaele</a:t>
-            </a:r>
-            <a:r>
-              <a:rPr lang="en-US" sz="2400" baseline="30000" dirty="0"/>
-              <a:t> </a:t>
-            </a:r>
-            <a:r>
-              <a:rPr lang="en-US" sz="2400" baseline="30000" dirty="0" err="1"/>
-              <a:t>Puechmaille</a:t>
-            </a:r>
-            <a:r>
-              <a:rPr lang="en-US" sz="2400" baseline="30000" dirty="0"/>
-              <a:t>, M. S. and </a:t>
-            </a:r>
-            <a:r>
-              <a:rPr lang="en-US" sz="2400" baseline="30000" dirty="0" err="1"/>
-              <a:t>Prieto</a:t>
-            </a:r>
-            <a:r>
-              <a:rPr lang="en-US" sz="2400" baseline="30000" dirty="0"/>
-              <a:t>, J. C., “Civility: Cloud based interactive visualization of </a:t>
-            </a:r>
-            <a:r>
-              <a:rPr lang="en-US" sz="2400" baseline="30000" dirty="0" err="1"/>
-              <a:t>tractography</a:t>
-            </a:r>
-            <a:r>
-              <a:rPr lang="en-US" sz="2400" baseline="30000" dirty="0"/>
-              <a:t> brain </a:t>
-            </a:r>
-            <a:r>
-              <a:rPr lang="en-US" sz="2400" baseline="30000" dirty="0" err="1"/>
-              <a:t>connectome</a:t>
-            </a:r>
-            <a:r>
-              <a:rPr lang="en-US" sz="2400" baseline="30000" dirty="0"/>
-              <a:t>,” in [SPIE Medical Imaging], International Society for Optics and Photonics (2017).</a:t>
-            </a:r>
-          </a:p>
-          <a:p>
-            <a:r>
-              <a:rPr lang="en-US" sz="2400" baseline="30000" dirty="0"/>
-              <a:t>[7] </a:t>
-            </a:r>
-            <a:r>
-              <a:rPr lang="en-US" sz="2400" baseline="30000" dirty="0" err="1"/>
-              <a:t>Styner</a:t>
-            </a:r>
-            <a:r>
-              <a:rPr lang="en-US" sz="2400" baseline="30000" dirty="0"/>
-              <a:t>, M., </a:t>
-            </a:r>
-            <a:r>
-              <a:rPr lang="en-US" sz="2400" baseline="30000" dirty="0" err="1"/>
-              <a:t>Oguz</a:t>
-            </a:r>
-            <a:r>
-              <a:rPr lang="en-US" sz="2400" baseline="30000" dirty="0"/>
-              <a:t>, I., </a:t>
-            </a:r>
-            <a:r>
-              <a:rPr lang="en-US" sz="2400" baseline="30000" dirty="0" err="1"/>
-              <a:t>Xu</a:t>
-            </a:r>
-            <a:r>
-              <a:rPr lang="en-US" sz="2400" baseline="30000" dirty="0"/>
-              <a:t>, S., </a:t>
-            </a:r>
-            <a:r>
-              <a:rPr lang="en-US" sz="2400" baseline="30000" dirty="0" err="1"/>
-              <a:t>Brechbuehler</a:t>
-            </a:r>
-            <a:r>
-              <a:rPr lang="en-US" sz="2400" baseline="30000" dirty="0"/>
-              <a:t>, C., </a:t>
-            </a:r>
-            <a:r>
-              <a:rPr lang="en-US" sz="2400" baseline="30000" dirty="0" err="1"/>
-              <a:t>Pantazis</a:t>
-            </a:r>
-            <a:r>
-              <a:rPr lang="en-US" sz="2400" baseline="30000" dirty="0"/>
-              <a:t>, D., Levitt, J., </a:t>
-            </a:r>
-            <a:r>
-              <a:rPr lang="en-US" sz="2400" baseline="30000" dirty="0" err="1"/>
-              <a:t>Shenton</a:t>
-            </a:r>
-            <a:r>
-              <a:rPr lang="en-US" sz="2400" baseline="30000" dirty="0"/>
-              <a:t>, M., and </a:t>
-            </a:r>
-            <a:r>
-              <a:rPr lang="en-US" sz="2400" baseline="30000" dirty="0" err="1"/>
-              <a:t>Gerig</a:t>
-            </a:r>
-            <a:r>
-              <a:rPr lang="en-US" sz="2400" baseline="30000" dirty="0"/>
-              <a:t>, G., “Frame- work for the statistical shape analysis of brain structures using </a:t>
-            </a:r>
-            <a:r>
-              <a:rPr lang="en-US" sz="2400" baseline="30000" dirty="0" err="1"/>
-              <a:t>spharm-pdm</a:t>
-            </a:r>
-            <a:r>
-              <a:rPr lang="en-US" sz="2400" baseline="30000" dirty="0"/>
-              <a:t>,” (07 2006).</a:t>
-            </a:r>
-            <a:endParaRPr lang="en-US" sz="2400" dirty="0"/>
+              <a:rPr lang="en-US" sz="1800" dirty="0"/>
+              <a:t> joint osteoarthritis,” Computerized Medical Imaging and Graphics 35(5), 345–352 (2011).</a:t>
+            </a:r>
+            <a:endParaRPr lang="en-US" sz="1800" dirty="0"/>
           </a:p>
         </p:txBody>
       </p:sp>
@@ -5799,7 +6138,7 @@
         </p:nvSpPr>
         <p:spPr>
           <a:xfrm>
-            <a:off x="12696420" y="6207125"/>
+            <a:off x="12696420" y="6018981"/>
             <a:ext cx="11318484" cy="3572012"/>
           </a:xfrm>
           <a:prstGeom prst="roundRect">
@@ -5831,14 +6170,19 @@
               </a:rPr>
               <a:t>Patients with OA present a variety of symptoms including pain, limited jaw movement, grinding, clicking, </a:t>
             </a:r>
-          </a:p>
-          <a:p>
+            <a:r>
+              <a:rPr lang="en-US" sz="3600" dirty="0" smtClean="0">
+                <a:latin typeface="Helvetica" charset="0"/>
+                <a:cs typeface="Helvetica" charset="0"/>
+              </a:rPr>
+              <a:t>and </a:t>
+            </a:r>
             <a:r>
               <a:rPr lang="en-US" sz="3600" dirty="0">
                 <a:latin typeface="Helvetica" charset="0"/>
                 <a:cs typeface="Helvetica" charset="0"/>
               </a:rPr>
-              <a:t>and deviation on opening. </a:t>
+              <a:t>deviation on opening. </a:t>
             </a:r>
             <a:r>
               <a:rPr lang="en-US" sz="3600" dirty="0" smtClean="0">
@@ -5883,12 +6227,17 @@
         </p:blipFill>
         <p:spPr>
           <a:xfrm>
-            <a:off x="18614020" y="15208131"/>
-            <a:ext cx="4654918" cy="5308699"/>
+            <a:off x="18741020" y="14487535"/>
+            <a:ext cx="4415512" cy="5035669"/>
           </a:xfrm>
           <a:prstGeom prst="rect">
             <a:avLst/>
           </a:prstGeom>
+          <a:ln>
+            <a:solidFill>
+              <a:srgbClr val="4F81BD"/>
+            </a:solidFill>
+          </a:ln>
         </p:spPr>
       </p:pic>
       <p:grpSp>
@@ -5899,10 +6248,10 @@
         </p:nvGrpSpPr>
         <p:grpSpPr>
           <a:xfrm>
-            <a:off x="12491868" y="20848319"/>
-            <a:ext cx="11749831" cy="6156464"/>
-            <a:chOff x="12533580" y="29566289"/>
-            <a:chExt cx="11749831" cy="6156464"/>
+            <a:off x="12491868" y="19746723"/>
+            <a:ext cx="11749831" cy="5800864"/>
+            <a:chOff x="12533580" y="29921889"/>
+            <a:chExt cx="11749831" cy="5800864"/>
           </a:xfrm>
         </p:grpSpPr>
         <p:pic>
@@ -5933,6 +6282,11 @@
             <a:prstGeom prst="rect">
               <a:avLst/>
             </a:prstGeom>
+            <a:ln>
+              <a:solidFill>
+                <a:srgbClr val="4F81BD"/>
+              </a:solidFill>
+            </a:ln>
           </p:spPr>
         </p:pic>
         <p:pic>
@@ -5957,12 +6311,17 @@
           </p:blipFill>
           <p:spPr>
             <a:xfrm>
-              <a:off x="12533580" y="29566289"/>
+              <a:off x="12533580" y="29921889"/>
               <a:ext cx="11737532" cy="2901803"/>
             </a:xfrm>
             <a:prstGeom prst="rect">
               <a:avLst/>
             </a:prstGeom>
+            <a:ln>
+              <a:solidFill>
+                <a:srgbClr val="4F81BD"/>
+              </a:solidFill>
+            </a:ln>
           </p:spPr>
         </p:pic>
       </p:grpSp>
@@ -5988,12 +6347,17 @@
         </p:blipFill>
         <p:spPr>
           <a:xfrm>
-            <a:off x="25404921" y="5939842"/>
-            <a:ext cx="10669060" cy="7484266"/>
+            <a:off x="25523714" y="5736015"/>
+            <a:ext cx="10032859" cy="7037976"/>
           </a:xfrm>
           <a:prstGeom prst="rect">
             <a:avLst/>
           </a:prstGeom>
+          <a:ln>
+            <a:solidFill>
+              <a:srgbClr val="4F81BD"/>
+            </a:solidFill>
+          </a:ln>
         </p:spPr>
       </p:pic>
       <p:pic>
@@ -6012,12 +6376,17 @@
         </p:blipFill>
         <p:spPr>
           <a:xfrm>
-            <a:off x="13607282" y="15253940"/>
-            <a:ext cx="4088053" cy="5262890"/>
+            <a:off x="13734283" y="14533344"/>
+            <a:ext cx="3877802" cy="4992216"/>
           </a:xfrm>
           <a:prstGeom prst="rect">
             <a:avLst/>
           </a:prstGeom>
+          <a:ln>
+            <a:solidFill>
+              <a:srgbClr val="4F81BD"/>
+            </a:solidFill>
+          </a:ln>
         </p:spPr>
       </p:pic>
       <p:pic>
@@ -6042,12 +6411,17 @@
         </p:blipFill>
         <p:spPr>
           <a:xfrm>
-            <a:off x="13196178" y="32508912"/>
+            <a:off x="13334573" y="27502338"/>
             <a:ext cx="4667250" cy="4381500"/>
           </a:xfrm>
           <a:prstGeom prst="rect">
             <a:avLst/>
           </a:prstGeom>
+          <a:ln>
+            <a:solidFill>
+              <a:srgbClr val="4F81BD"/>
+            </a:solidFill>
+          </a:ln>
         </p:spPr>
       </p:pic>
       <p:pic>
@@ -6072,12 +6446,17 @@
         </p:blipFill>
         <p:spPr>
           <a:xfrm>
-            <a:off x="18790023" y="32442065"/>
+            <a:off x="19152322" y="27476020"/>
             <a:ext cx="4667250" cy="4381500"/>
           </a:xfrm>
           <a:prstGeom prst="rect">
             <a:avLst/>
           </a:prstGeom>
+          <a:ln>
+            <a:solidFill>
+              <a:srgbClr val="4F81BD"/>
+            </a:solidFill>
+          </a:ln>
         </p:spPr>
       </p:pic>
       <p:grpSp>
@@ -6088,8 +6467,8 @@
         </p:nvGrpSpPr>
         <p:grpSpPr>
           <a:xfrm>
-            <a:off x="12687791" y="28660433"/>
-            <a:ext cx="11687580" cy="3905250"/>
+            <a:off x="12449248" y="32037783"/>
+            <a:ext cx="11883503" cy="4116912"/>
             <a:chOff x="12696420" y="28301954"/>
             <a:chExt cx="11687580" cy="3905250"/>
           </a:xfrm>
@@ -6122,6 +6501,11 @@
             <a:prstGeom prst="rect">
               <a:avLst/>
             </a:prstGeom>
+            <a:ln>
+              <a:solidFill>
+                <a:srgbClr val="4F81BD"/>
+              </a:solidFill>
+            </a:ln>
           </p:spPr>
         </p:pic>
         <p:pic>
@@ -6152,6 +6536,11 @@
             <a:prstGeom prst="rect">
               <a:avLst/>
             </a:prstGeom>
+            <a:ln>
+              <a:solidFill>
+                <a:srgbClr val="4F81BD"/>
+              </a:solidFill>
+            </a:ln>
           </p:spPr>
         </p:pic>
         <p:pic>
@@ -6182,6 +6571,11 @@
             <a:prstGeom prst="rect">
               <a:avLst/>
             </a:prstGeom>
+            <a:ln>
+              <a:solidFill>
+                <a:srgbClr val="4F81BD"/>
+              </a:solidFill>
+            </a:ln>
           </p:spPr>
         </p:pic>
         <p:pic>
@@ -6212,6 +6606,11 @@
             <a:prstGeom prst="rect">
               <a:avLst/>
             </a:prstGeom>
+            <a:ln>
+              <a:solidFill>
+                <a:srgbClr val="4F81BD"/>
+              </a:solidFill>
+            </a:ln>
           </p:spPr>
         </p:pic>
       </p:grpSp>
@@ -6237,14 +6636,701 @@
         </p:blipFill>
         <p:spPr>
           <a:xfrm>
-            <a:off x="26609569" y="15320788"/>
-            <a:ext cx="8881342" cy="5902158"/>
+            <a:off x="25529944" y="15484704"/>
+            <a:ext cx="10073862" cy="6694656"/>
           </a:xfrm>
           <a:prstGeom prst="rect">
             <a:avLst/>
           </a:prstGeom>
+          <a:ln>
+            <a:solidFill>
+              <a:srgbClr val="4F81BD"/>
+            </a:solidFill>
+          </a:ln>
         </p:spPr>
       </p:pic>
+      <p:sp>
+        <p:nvSpPr>
+          <p:cNvPr id="81" name="Rounded Rectangle 80"/>
+          <p:cNvSpPr/>
+          <p:nvPr/>
+        </p:nvSpPr>
+        <p:spPr>
+          <a:xfrm>
+            <a:off x="12676436" y="25621125"/>
+            <a:ext cx="11536368" cy="1608331"/>
+          </a:xfrm>
+          <a:prstGeom prst="roundRect">
+            <a:avLst/>
+          </a:prstGeom>
+        </p:spPr>
+        <p:style>
+          <a:lnRef idx="2">
+            <a:schemeClr val="accent1"/>
+          </a:lnRef>
+          <a:fillRef idx="1">
+            <a:schemeClr val="lt1"/>
+          </a:fillRef>
+          <a:effectRef idx="0">
+            <a:schemeClr val="accent1"/>
+          </a:effectRef>
+          <a:fontRef idx="minor">
+            <a:schemeClr val="dk1"/>
+          </a:fontRef>
+        </p:style>
+        <p:txBody>
+          <a:bodyPr rtlCol="0" anchor="ctr"/>
+          <a:lstStyle/>
+          <a:p>
+            <a:pPr algn="ctr"/>
+            <a:r>
+              <a:rPr lang="en-US" sz="2800" dirty="0" smtClean="0"/>
+              <a:t>Fig 3</a:t>
+            </a:r>
+            <a:r>
+              <a:rPr lang="en-US" sz="2800" dirty="0" smtClean="0"/>
+              <a:t>. a) SPHARM: regular triangles, 1002 points. </a:t>
+            </a:r>
+            <a:r>
+              <a:rPr lang="en-US" sz="2800" dirty="0"/>
+              <a:t>b</a:t>
+            </a:r>
+            <a:r>
+              <a:rPr lang="en-US" sz="2800" dirty="0" smtClean="0"/>
+              <a:t>) Landmarks placed on homologous regions for each model. </a:t>
+            </a:r>
+            <a:r>
+              <a:rPr lang="en-US" sz="2800" dirty="0"/>
+              <a:t>c</a:t>
+            </a:r>
+            <a:r>
+              <a:rPr lang="en-US" sz="2800" dirty="0" smtClean="0"/>
+              <a:t>) Before (top) - after (bottom) GROUPS alignment, similar regions coded by color. </a:t>
+            </a:r>
+            <a:endParaRPr lang="en-US" sz="2800" dirty="0"/>
+          </a:p>
+        </p:txBody>
+      </p:sp>
+      <p:sp>
+        <p:nvSpPr>
+          <p:cNvPr id="82" name="Rounded Rectangle 81"/>
+          <p:cNvSpPr/>
+          <p:nvPr/>
+        </p:nvSpPr>
+        <p:spPr>
+          <a:xfrm>
+            <a:off x="12829812" y="14521490"/>
+            <a:ext cx="848025" cy="807719"/>
+          </a:xfrm>
+          <a:prstGeom prst="roundRect">
+            <a:avLst/>
+          </a:prstGeom>
+        </p:spPr>
+        <p:style>
+          <a:lnRef idx="2">
+            <a:schemeClr val="accent1"/>
+          </a:lnRef>
+          <a:fillRef idx="1">
+            <a:schemeClr val="lt1"/>
+          </a:fillRef>
+          <a:effectRef idx="0">
+            <a:schemeClr val="accent1"/>
+          </a:effectRef>
+          <a:fontRef idx="minor">
+            <a:schemeClr val="dk1"/>
+          </a:fontRef>
+        </p:style>
+        <p:txBody>
+          <a:bodyPr rtlCol="0" anchor="ctr"/>
+          <a:lstStyle/>
+          <a:p>
+            <a:pPr algn="ctr"/>
+            <a:r>
+              <a:rPr lang="en-US" sz="2800" dirty="0" smtClean="0"/>
+              <a:t>a)</a:t>
+            </a:r>
+            <a:endParaRPr lang="en-US" sz="2800" dirty="0"/>
+          </a:p>
+        </p:txBody>
+      </p:sp>
+      <p:sp>
+        <p:nvSpPr>
+          <p:cNvPr id="83" name="Rounded Rectangle 82"/>
+          <p:cNvSpPr/>
+          <p:nvPr/>
+        </p:nvSpPr>
+        <p:spPr>
+          <a:xfrm>
+            <a:off x="17831399" y="14471143"/>
+            <a:ext cx="848025" cy="807719"/>
+          </a:xfrm>
+          <a:prstGeom prst="roundRect">
+            <a:avLst/>
+          </a:prstGeom>
+        </p:spPr>
+        <p:style>
+          <a:lnRef idx="2">
+            <a:schemeClr val="accent1"/>
+          </a:lnRef>
+          <a:fillRef idx="1">
+            <a:schemeClr val="lt1"/>
+          </a:fillRef>
+          <a:effectRef idx="0">
+            <a:schemeClr val="accent1"/>
+          </a:effectRef>
+          <a:fontRef idx="minor">
+            <a:schemeClr val="dk1"/>
+          </a:fontRef>
+        </p:style>
+        <p:txBody>
+          <a:bodyPr rtlCol="0" anchor="ctr"/>
+          <a:lstStyle/>
+          <a:p>
+            <a:pPr algn="ctr"/>
+            <a:r>
+              <a:rPr lang="en-US" sz="2800" dirty="0"/>
+              <a:t>b</a:t>
+            </a:r>
+            <a:r>
+              <a:rPr lang="en-US" sz="2800" dirty="0" smtClean="0"/>
+              <a:t>)</a:t>
+            </a:r>
+            <a:endParaRPr lang="en-US" sz="2800" dirty="0"/>
+          </a:p>
+        </p:txBody>
+      </p:sp>
+      <p:sp>
+        <p:nvSpPr>
+          <p:cNvPr id="91" name="Rounded Rectangle 90"/>
+          <p:cNvSpPr/>
+          <p:nvPr/>
+        </p:nvSpPr>
+        <p:spPr>
+          <a:xfrm>
+            <a:off x="12511880" y="18939004"/>
+            <a:ext cx="848025" cy="807719"/>
+          </a:xfrm>
+          <a:prstGeom prst="roundRect">
+            <a:avLst/>
+          </a:prstGeom>
+        </p:spPr>
+        <p:style>
+          <a:lnRef idx="2">
+            <a:schemeClr val="accent1"/>
+          </a:lnRef>
+          <a:fillRef idx="1">
+            <a:schemeClr val="lt1"/>
+          </a:fillRef>
+          <a:effectRef idx="0">
+            <a:schemeClr val="accent1"/>
+          </a:effectRef>
+          <a:fontRef idx="minor">
+            <a:schemeClr val="dk1"/>
+          </a:fontRef>
+        </p:style>
+        <p:txBody>
+          <a:bodyPr rtlCol="0" anchor="ctr"/>
+          <a:lstStyle/>
+          <a:p>
+            <a:pPr algn="ctr"/>
+            <a:r>
+              <a:rPr lang="en-US" sz="2800" dirty="0" smtClean="0"/>
+              <a:t>c)</a:t>
+            </a:r>
+            <a:endParaRPr lang="en-US" sz="2800" dirty="0"/>
+          </a:p>
+        </p:txBody>
+      </p:sp>
+      <p:sp>
+        <p:nvSpPr>
+          <p:cNvPr id="93" name="Rounded Rectangle 92"/>
+          <p:cNvSpPr/>
+          <p:nvPr/>
+        </p:nvSpPr>
+        <p:spPr>
+          <a:xfrm>
+            <a:off x="18241422" y="27482048"/>
+            <a:ext cx="848025" cy="807719"/>
+          </a:xfrm>
+          <a:prstGeom prst="roundRect">
+            <a:avLst/>
+          </a:prstGeom>
+        </p:spPr>
+        <p:style>
+          <a:lnRef idx="2">
+            <a:schemeClr val="accent1"/>
+          </a:lnRef>
+          <a:fillRef idx="1">
+            <a:schemeClr val="lt1"/>
+          </a:fillRef>
+          <a:effectRef idx="0">
+            <a:schemeClr val="accent1"/>
+          </a:effectRef>
+          <a:fontRef idx="minor">
+            <a:schemeClr val="dk1"/>
+          </a:fontRef>
+        </p:style>
+        <p:txBody>
+          <a:bodyPr rtlCol="0" anchor="ctr"/>
+          <a:lstStyle/>
+          <a:p>
+            <a:pPr algn="ctr"/>
+            <a:r>
+              <a:rPr lang="en-US" sz="2800" dirty="0"/>
+              <a:t>b</a:t>
+            </a:r>
+            <a:r>
+              <a:rPr lang="en-US" sz="2800" dirty="0" smtClean="0"/>
+              <a:t>)</a:t>
+            </a:r>
+            <a:endParaRPr lang="en-US" sz="2800" dirty="0"/>
+          </a:p>
+        </p:txBody>
+      </p:sp>
+      <p:sp>
+        <p:nvSpPr>
+          <p:cNvPr id="95" name="Rounded Rectangle 94"/>
+          <p:cNvSpPr/>
+          <p:nvPr/>
+        </p:nvSpPr>
+        <p:spPr>
+          <a:xfrm>
+            <a:off x="12458777" y="27502338"/>
+            <a:ext cx="848025" cy="807719"/>
+          </a:xfrm>
+          <a:prstGeom prst="roundRect">
+            <a:avLst/>
+          </a:prstGeom>
+        </p:spPr>
+        <p:style>
+          <a:lnRef idx="2">
+            <a:schemeClr val="accent1"/>
+          </a:lnRef>
+          <a:fillRef idx="1">
+            <a:schemeClr val="lt1"/>
+          </a:fillRef>
+          <a:effectRef idx="0">
+            <a:schemeClr val="accent1"/>
+          </a:effectRef>
+          <a:fontRef idx="minor">
+            <a:schemeClr val="dk1"/>
+          </a:fontRef>
+        </p:style>
+        <p:txBody>
+          <a:bodyPr rtlCol="0" anchor="ctr"/>
+          <a:lstStyle/>
+          <a:p>
+            <a:pPr algn="ctr"/>
+            <a:r>
+              <a:rPr lang="en-US" sz="2800" dirty="0" smtClean="0"/>
+              <a:t>a)</a:t>
+            </a:r>
+            <a:endParaRPr lang="en-US" sz="2800" dirty="0"/>
+          </a:p>
+        </p:txBody>
+      </p:sp>
+      <p:sp>
+        <p:nvSpPr>
+          <p:cNvPr id="97" name="Rounded Rectangle 96"/>
+          <p:cNvSpPr/>
+          <p:nvPr/>
+        </p:nvSpPr>
+        <p:spPr>
+          <a:xfrm>
+            <a:off x="12425730" y="31230064"/>
+            <a:ext cx="848025" cy="807719"/>
+          </a:xfrm>
+          <a:prstGeom prst="roundRect">
+            <a:avLst/>
+          </a:prstGeom>
+        </p:spPr>
+        <p:style>
+          <a:lnRef idx="2">
+            <a:schemeClr val="accent1"/>
+          </a:lnRef>
+          <a:fillRef idx="1">
+            <a:schemeClr val="lt1"/>
+          </a:fillRef>
+          <a:effectRef idx="0">
+            <a:schemeClr val="accent1"/>
+          </a:effectRef>
+          <a:fontRef idx="minor">
+            <a:schemeClr val="dk1"/>
+          </a:fontRef>
+        </p:style>
+        <p:txBody>
+          <a:bodyPr rtlCol="0" anchor="ctr"/>
+          <a:lstStyle/>
+          <a:p>
+            <a:pPr algn="ctr"/>
+            <a:r>
+              <a:rPr lang="en-US" sz="2800" dirty="0" smtClean="0"/>
+              <a:t>c)</a:t>
+            </a:r>
+            <a:endParaRPr lang="en-US" sz="2800" dirty="0"/>
+          </a:p>
+        </p:txBody>
+      </p:sp>
+      <p:sp>
+        <p:nvSpPr>
+          <p:cNvPr id="98" name="Rounded Rectangle 97"/>
+          <p:cNvSpPr/>
+          <p:nvPr/>
+        </p:nvSpPr>
+        <p:spPr>
+          <a:xfrm>
+            <a:off x="12676436" y="36280439"/>
+            <a:ext cx="11536368" cy="1717961"/>
+          </a:xfrm>
+          <a:prstGeom prst="roundRect">
+            <a:avLst/>
+          </a:prstGeom>
+        </p:spPr>
+        <p:style>
+          <a:lnRef idx="2">
+            <a:schemeClr val="accent1"/>
+          </a:lnRef>
+          <a:fillRef idx="1">
+            <a:schemeClr val="lt1"/>
+          </a:fillRef>
+          <a:effectRef idx="0">
+            <a:schemeClr val="accent1"/>
+          </a:effectRef>
+          <a:fontRef idx="minor">
+            <a:schemeClr val="dk1"/>
+          </a:fontRef>
+        </p:style>
+        <p:txBody>
+          <a:bodyPr rtlCol="0" anchor="ctr"/>
+          <a:lstStyle/>
+          <a:p>
+            <a:pPr algn="ctr"/>
+            <a:r>
+              <a:rPr lang="en-US" sz="2800" dirty="0" smtClean="0"/>
+              <a:t>Fig 4</a:t>
+            </a:r>
+            <a:r>
+              <a:rPr lang="en-US" sz="2800" dirty="0" smtClean="0"/>
+              <a:t>. Visualization of shape features. a) Mean curvature b) Surface </a:t>
+            </a:r>
+            <a:r>
+              <a:rPr lang="en-US" sz="2800" dirty="0" err="1" smtClean="0"/>
+              <a:t>normals</a:t>
+            </a:r>
+            <a:r>
+              <a:rPr lang="en-US" sz="2800" dirty="0" smtClean="0"/>
+              <a:t>. </a:t>
+            </a:r>
+            <a:r>
+              <a:rPr lang="en-US" sz="2800" dirty="0"/>
+              <a:t>c</a:t>
+            </a:r>
+            <a:r>
+              <a:rPr lang="en-US" sz="2800" dirty="0" smtClean="0"/>
+              <a:t>) Distance from each point to corresponding points in the average shape for each group. Total number of features per point is 11, i.e., 1002x11.</a:t>
+            </a:r>
+            <a:endParaRPr lang="en-US" sz="2800" dirty="0"/>
+          </a:p>
+        </p:txBody>
+      </p:sp>
+      <p:sp>
+        <p:nvSpPr>
+          <p:cNvPr id="99" name="Rounded Rectangle 98"/>
+          <p:cNvSpPr/>
+          <p:nvPr/>
+        </p:nvSpPr>
+        <p:spPr>
+          <a:xfrm>
+            <a:off x="25523713" y="12930372"/>
+            <a:ext cx="10031745" cy="663094"/>
+          </a:xfrm>
+          <a:prstGeom prst="roundRect">
+            <a:avLst/>
+          </a:prstGeom>
+        </p:spPr>
+        <p:style>
+          <a:lnRef idx="2">
+            <a:schemeClr val="accent1"/>
+          </a:lnRef>
+          <a:fillRef idx="1">
+            <a:schemeClr val="lt1"/>
+          </a:fillRef>
+          <a:effectRef idx="0">
+            <a:schemeClr val="accent1"/>
+          </a:effectRef>
+          <a:fontRef idx="minor">
+            <a:schemeClr val="dk1"/>
+          </a:fontRef>
+        </p:style>
+        <p:txBody>
+          <a:bodyPr rtlCol="0" anchor="ctr"/>
+          <a:lstStyle/>
+          <a:p>
+            <a:pPr algn="ctr"/>
+            <a:r>
+              <a:rPr lang="en-US" sz="2800" dirty="0" smtClean="0"/>
+              <a:t>Fig 5. SMOTE resampling in feature space.  </a:t>
+            </a:r>
+            <a:endParaRPr lang="en-US" sz="2800" dirty="0"/>
+          </a:p>
+        </p:txBody>
+      </p:sp>
+      <p:sp>
+        <p:nvSpPr>
+          <p:cNvPr id="100" name="Rounded Rectangle 99"/>
+          <p:cNvSpPr/>
+          <p:nvPr/>
+        </p:nvSpPr>
+        <p:spPr>
+          <a:xfrm>
+            <a:off x="25572061" y="22381410"/>
+            <a:ext cx="10031745" cy="663094"/>
+          </a:xfrm>
+          <a:prstGeom prst="roundRect">
+            <a:avLst/>
+          </a:prstGeom>
+        </p:spPr>
+        <p:style>
+          <a:lnRef idx="2">
+            <a:schemeClr val="accent1"/>
+          </a:lnRef>
+          <a:fillRef idx="1">
+            <a:schemeClr val="lt1"/>
+          </a:fillRef>
+          <a:effectRef idx="0">
+            <a:schemeClr val="accent1"/>
+          </a:effectRef>
+          <a:fontRef idx="minor">
+            <a:schemeClr val="dk1"/>
+          </a:fontRef>
+        </p:style>
+        <p:txBody>
+          <a:bodyPr rtlCol="0" anchor="ctr"/>
+          <a:lstStyle/>
+          <a:p>
+            <a:pPr algn="ctr"/>
+            <a:r>
+              <a:rPr lang="en-US" sz="2800" dirty="0" smtClean="0"/>
+              <a:t>Fig 6. Accuracy during training. Testing accuracy was 92%.</a:t>
+            </a:r>
+            <a:endParaRPr lang="en-US" sz="2800" dirty="0"/>
+          </a:p>
+        </p:txBody>
+      </p:sp>
+      <p:sp>
+        <p:nvSpPr>
+          <p:cNvPr id="101" name="Rectangle 46"/>
+          <p:cNvSpPr>
+            <a:spLocks noChangeArrowheads="1"/>
+          </p:cNvSpPr>
+          <p:nvPr/>
+        </p:nvSpPr>
+        <p:spPr bwMode="auto">
+          <a:xfrm>
+            <a:off x="25810660" y="24192618"/>
+            <a:ext cx="10160000" cy="100012"/>
+          </a:xfrm>
+          <a:prstGeom prst="rect">
+            <a:avLst/>
+          </a:prstGeom>
+          <a:solidFill>
+            <a:srgbClr val="2163A1"/>
+          </a:solidFill>
+          <a:ln>
+            <a:noFill/>
+          </a:ln>
+          <a:extLst>
+            <a:ext uri="{91240B29-F687-4f45-9708-019B960494DF}">
+              <a14:hiddenLine xmlns:a14="http://schemas.microsoft.com/office/drawing/2010/main" w="9525">
+                <a:solidFill>
+                  <a:srgbClr val="000000"/>
+                </a:solidFill>
+                <a:round/>
+                <a:headEnd/>
+                <a:tailEnd/>
+              </a14:hiddenLine>
+            </a:ext>
+          </a:extLst>
+        </p:spPr>
+        <p:txBody>
+          <a:bodyPr/>
+          <a:lstStyle/>
+          <a:p>
+            <a:pPr defTabSz="2193925"/>
+            <a:endParaRPr lang="en-US" sz="10600"/>
+          </a:p>
+        </p:txBody>
+      </p:sp>
+      <p:sp>
+        <p:nvSpPr>
+          <p:cNvPr id="94" name="Rounded Rectangle 93"/>
+          <p:cNvSpPr/>
+          <p:nvPr/>
+        </p:nvSpPr>
+        <p:spPr>
+          <a:xfrm>
+            <a:off x="24948445" y="24529385"/>
+            <a:ext cx="11089126" cy="5829511"/>
+          </a:xfrm>
+          <a:prstGeom prst="roundRect">
+            <a:avLst>
+              <a:gd name="adj" fmla="val 10037"/>
+            </a:avLst>
+          </a:prstGeom>
+        </p:spPr>
+        <p:style>
+          <a:lnRef idx="2">
+            <a:schemeClr val="accent1"/>
+          </a:lnRef>
+          <a:fillRef idx="1">
+            <a:schemeClr val="lt1"/>
+          </a:fillRef>
+          <a:effectRef idx="0">
+            <a:schemeClr val="accent1"/>
+          </a:effectRef>
+          <a:fontRef idx="minor">
+            <a:schemeClr val="dk1"/>
+          </a:fontRef>
+        </p:style>
+        <p:txBody>
+          <a:bodyPr rtlCol="0" anchor="ctr"/>
+          <a:lstStyle/>
+          <a:p>
+            <a:r>
+              <a:rPr lang="en-US" sz="3600" dirty="0">
+                <a:latin typeface="Helvetica" charset="0"/>
+                <a:cs typeface="Helvetica" charset="0"/>
+              </a:rPr>
+              <a:t>U</a:t>
+            </a:r>
+            <a:r>
+              <a:rPr lang="en-US" sz="3600" dirty="0" smtClean="0">
+                <a:latin typeface="Helvetica" charset="0"/>
+                <a:cs typeface="Helvetica" charset="0"/>
+              </a:rPr>
+              <a:t>sing </a:t>
+            </a:r>
+            <a:r>
+              <a:rPr lang="en-US" sz="3600" dirty="0">
+                <a:latin typeface="Helvetica" charset="0"/>
+                <a:cs typeface="Helvetica" charset="0"/>
+              </a:rPr>
+              <a:t>shape features only favors the classification task, i.e.</a:t>
+            </a:r>
+            <a:r>
+              <a:rPr lang="en-US" sz="3600" dirty="0" smtClean="0">
+                <a:latin typeface="Helvetica" charset="0"/>
+                <a:cs typeface="Helvetica" charset="0"/>
+              </a:rPr>
+              <a:t>, no position </a:t>
+            </a:r>
+            <a:r>
+              <a:rPr lang="en-US" sz="3600" dirty="0">
+                <a:latin typeface="Helvetica" charset="0"/>
+                <a:cs typeface="Helvetica" charset="0"/>
+              </a:rPr>
+              <a:t>or orientation </a:t>
+            </a:r>
+            <a:r>
+              <a:rPr lang="en-US" sz="3600" dirty="0" smtClean="0">
+                <a:latin typeface="Helvetica" charset="0"/>
+                <a:cs typeface="Helvetica" charset="0"/>
+              </a:rPr>
+              <a:t>is used to train the network. </a:t>
+            </a:r>
+          </a:p>
+          <a:p>
+            <a:r>
+              <a:rPr lang="en-US" sz="3600" dirty="0">
+                <a:latin typeface="Helvetica" charset="0"/>
+                <a:cs typeface="Helvetica" charset="0"/>
+              </a:rPr>
+              <a:t>This classification approach seems promising, as it may help us increase our understanding about </a:t>
+            </a:r>
+          </a:p>
+          <a:p>
+            <a:r>
+              <a:rPr lang="en-US" sz="3600" dirty="0">
+                <a:latin typeface="Helvetica" charset="0"/>
+                <a:cs typeface="Helvetica" charset="0"/>
+              </a:rPr>
+              <a:t>shape changes that TMJ OA patients undergo during the course of the disease. </a:t>
+            </a:r>
+            <a:endParaRPr lang="en-US" sz="3600" dirty="0" smtClean="0">
+              <a:latin typeface="Helvetica" charset="0"/>
+              <a:cs typeface="Helvetica" charset="0"/>
+            </a:endParaRPr>
+          </a:p>
+          <a:p>
+            <a:r>
+              <a:rPr lang="en-US" sz="3600" dirty="0" smtClean="0">
+                <a:latin typeface="Helvetica" charset="0"/>
+                <a:cs typeface="Helvetica" charset="0"/>
+              </a:rPr>
+              <a:t>Source code is available at</a:t>
+            </a:r>
+            <a:endParaRPr lang="en-US" sz="3600" dirty="0">
+              <a:latin typeface="Helvetica" charset="0"/>
+              <a:cs typeface="Helvetica" charset="0"/>
+            </a:endParaRPr>
+          </a:p>
+          <a:p>
+            <a:r>
+              <a:rPr lang="en-US" sz="3600" dirty="0" smtClean="0">
+                <a:latin typeface="Helvetica" charset="0"/>
+                <a:cs typeface="Helvetica" charset="0"/>
+              </a:rPr>
+              <a:t>https</a:t>
+            </a:r>
+            <a:r>
+              <a:rPr lang="en-US" sz="3600" dirty="0">
+                <a:latin typeface="Helvetica" charset="0"/>
+                <a:cs typeface="Helvetica" charset="0"/>
+              </a:rPr>
+              <a:t>://</a:t>
+            </a:r>
+            <a:r>
+              <a:rPr lang="en-US" sz="3600" dirty="0" err="1">
+                <a:latin typeface="Helvetica" charset="0"/>
+                <a:cs typeface="Helvetica" charset="0"/>
+              </a:rPr>
+              <a:t>github.com</a:t>
+            </a:r>
+            <a:r>
+              <a:rPr lang="en-US" sz="3600" dirty="0">
+                <a:latin typeface="Helvetica" charset="0"/>
+                <a:cs typeface="Helvetica" charset="0"/>
+              </a:rPr>
+              <a:t>/DCBIA-</a:t>
+            </a:r>
+            <a:r>
+              <a:rPr lang="en-US" sz="3600" dirty="0" err="1">
+                <a:latin typeface="Helvetica" charset="0"/>
+                <a:cs typeface="Helvetica" charset="0"/>
+              </a:rPr>
+              <a:t>OrthoLab</a:t>
+            </a:r>
+            <a:r>
+              <a:rPr lang="en-US" sz="3600" dirty="0">
+                <a:latin typeface="Helvetica" charset="0"/>
+                <a:cs typeface="Helvetica" charset="0"/>
+              </a:rPr>
+              <a:t>/</a:t>
+            </a:r>
+            <a:r>
+              <a:rPr lang="en-US" sz="3600" dirty="0" err="1" smtClean="0">
+                <a:latin typeface="Helvetica" charset="0"/>
+                <a:cs typeface="Helvetica" charset="0"/>
+              </a:rPr>
+              <a:t>ShapeVariationAnalyzer</a:t>
+            </a:r>
+            <a:endParaRPr lang="en-US" sz="3600" dirty="0">
+              <a:latin typeface="Helvetica" charset="0"/>
+              <a:cs typeface="Helvetica" charset="0"/>
+            </a:endParaRPr>
+          </a:p>
+        </p:txBody>
+      </p:sp>
     </p:spTree>
     <p:extLst>
       <p:ext uri="{BB962C8B-B14F-4D97-AF65-F5344CB8AC3E}">

</xml_diff>